<commit_message>
update neural networks - 3
</commit_message>
<xml_diff>
--- a/_Neural_Networks/Neural_Networks - Animacao.pptx
+++ b/_Neural_Networks/Neural_Networks - Animacao.pptx
@@ -3753,7 +3753,7 @@
                                   <p:childTnLst>
                                     <p:animEffect transition="out" filter="fade">
                                       <p:cBhvr>
-                                        <p:cTn id="6" dur="20000"/>
+                                        <p:cTn id="6" dur="3000"/>
                                         <p:tgtEl>
                                           <p:spTgt spid="8"/>
                                         </p:tgtEl>
@@ -3763,7 +3763,7 @@
                                       <p:cBhvr>
                                         <p:cTn id="7" dur="1" fill="hold">
                                           <p:stCondLst>
-                                            <p:cond delay="19999"/>
+                                            <p:cond delay="2999"/>
                                           </p:stCondLst>
                                         </p:cTn>
                                         <p:tgtEl>

</xml_diff>